<commit_message>
tried setting mean anomaly to 0
</commit_message>
<xml_diff>
--- a/Presentation/Junyan_Peng_Presentation.pptx
+++ b/Presentation/Junyan_Peng_Presentation.pptx
@@ -8,7 +8,14 @@
     <p:sldId id="259" r:id="rId2"/>
     <p:sldId id="257" r:id="rId3"/>
     <p:sldId id="258" r:id="rId4"/>
-    <p:sldId id="260" r:id="rId5"/>
+    <p:sldId id="261" r:id="rId5"/>
+    <p:sldId id="263" r:id="rId6"/>
+    <p:sldId id="265" r:id="rId7"/>
+    <p:sldId id="262" r:id="rId8"/>
+    <p:sldId id="264" r:id="rId9"/>
+    <p:sldId id="268" r:id="rId10"/>
+    <p:sldId id="267" r:id="rId11"/>
+    <p:sldId id="260" r:id="rId12"/>
   </p:sldIdLst>
   <p:sldSz cx="12192000" cy="6858000"/>
   <p:notesSz cx="6858000" cy="9144000"/>
@@ -246,7 +253,7 @@
           <a:p>
             <a:fld id="{92F6D378-F839-4F94-B173-FB3F4DF6F29B}" type="datetimeFigureOut">
               <a:rPr lang="en-US" smtClean="0"/>
-              <a:t>10/31/2019</a:t>
+              <a:t>2/6/2020</a:t>
             </a:fld>
             <a:endParaRPr lang="en-US"/>
           </a:p>
@@ -416,7 +423,7 @@
           <a:p>
             <a:fld id="{92F6D378-F839-4F94-B173-FB3F4DF6F29B}" type="datetimeFigureOut">
               <a:rPr lang="en-US" smtClean="0"/>
-              <a:t>10/31/2019</a:t>
+              <a:t>2/6/2020</a:t>
             </a:fld>
             <a:endParaRPr lang="en-US"/>
           </a:p>
@@ -596,7 +603,7 @@
           <a:p>
             <a:fld id="{92F6D378-F839-4F94-B173-FB3F4DF6F29B}" type="datetimeFigureOut">
               <a:rPr lang="en-US" smtClean="0"/>
-              <a:t>10/31/2019</a:t>
+              <a:t>2/6/2020</a:t>
             </a:fld>
             <a:endParaRPr lang="en-US"/>
           </a:p>
@@ -766,7 +773,7 @@
           <a:p>
             <a:fld id="{92F6D378-F839-4F94-B173-FB3F4DF6F29B}" type="datetimeFigureOut">
               <a:rPr lang="en-US" smtClean="0"/>
-              <a:t>10/31/2019</a:t>
+              <a:t>2/6/2020</a:t>
             </a:fld>
             <a:endParaRPr lang="en-US"/>
           </a:p>
@@ -1012,7 +1019,7 @@
           <a:p>
             <a:fld id="{92F6D378-F839-4F94-B173-FB3F4DF6F29B}" type="datetimeFigureOut">
               <a:rPr lang="en-US" smtClean="0"/>
-              <a:t>10/31/2019</a:t>
+              <a:t>2/6/2020</a:t>
             </a:fld>
             <a:endParaRPr lang="en-US"/>
           </a:p>
@@ -1244,7 +1251,7 @@
           <a:p>
             <a:fld id="{92F6D378-F839-4F94-B173-FB3F4DF6F29B}" type="datetimeFigureOut">
               <a:rPr lang="en-US" smtClean="0"/>
-              <a:t>10/31/2019</a:t>
+              <a:t>2/6/2020</a:t>
             </a:fld>
             <a:endParaRPr lang="en-US"/>
           </a:p>
@@ -1611,7 +1618,7 @@
           <a:p>
             <a:fld id="{92F6D378-F839-4F94-B173-FB3F4DF6F29B}" type="datetimeFigureOut">
               <a:rPr lang="en-US" smtClean="0"/>
-              <a:t>10/31/2019</a:t>
+              <a:t>2/6/2020</a:t>
             </a:fld>
             <a:endParaRPr lang="en-US"/>
           </a:p>
@@ -1729,7 +1736,7 @@
           <a:p>
             <a:fld id="{92F6D378-F839-4F94-B173-FB3F4DF6F29B}" type="datetimeFigureOut">
               <a:rPr lang="en-US" smtClean="0"/>
-              <a:t>10/31/2019</a:t>
+              <a:t>2/6/2020</a:t>
             </a:fld>
             <a:endParaRPr lang="en-US"/>
           </a:p>
@@ -1824,7 +1831,7 @@
           <a:p>
             <a:fld id="{92F6D378-F839-4F94-B173-FB3F4DF6F29B}" type="datetimeFigureOut">
               <a:rPr lang="en-US" smtClean="0"/>
-              <a:t>10/31/2019</a:t>
+              <a:t>2/6/2020</a:t>
             </a:fld>
             <a:endParaRPr lang="en-US"/>
           </a:p>
@@ -2101,7 +2108,7 @@
           <a:p>
             <a:fld id="{92F6D378-F839-4F94-B173-FB3F4DF6F29B}" type="datetimeFigureOut">
               <a:rPr lang="en-US" smtClean="0"/>
-              <a:t>10/31/2019</a:t>
+              <a:t>2/6/2020</a:t>
             </a:fld>
             <a:endParaRPr lang="en-US"/>
           </a:p>
@@ -2358,7 +2365,7 @@
           <a:p>
             <a:fld id="{92F6D378-F839-4F94-B173-FB3F4DF6F29B}" type="datetimeFigureOut">
               <a:rPr lang="en-US" smtClean="0"/>
-              <a:t>10/31/2019</a:t>
+              <a:t>2/6/2020</a:t>
             </a:fld>
             <a:endParaRPr lang="en-US"/>
           </a:p>
@@ -2571,7 +2578,7 @@
           <a:p>
             <a:fld id="{92F6D378-F839-4F94-B173-FB3F4DF6F29B}" type="datetimeFigureOut">
               <a:rPr lang="en-US" smtClean="0"/>
-              <a:t>10/31/2019</a:t>
+              <a:t>2/6/2020</a:t>
             </a:fld>
             <a:endParaRPr lang="en-US"/>
           </a:p>
@@ -3069,6 +3076,238 @@
 </p:sld>
 </file>
 
+<file path=ppt/slides/slide10.xml><?xml version="1.0" encoding="utf-8"?>
+<p:sld xmlns:a="http://schemas.openxmlformats.org/drawingml/2006/main" xmlns:r="http://schemas.openxmlformats.org/officeDocument/2006/relationships" xmlns:p="http://schemas.openxmlformats.org/presentationml/2006/main">
+  <p:cSld>
+    <p:bg>
+      <p:bgPr>
+        <a:blipFill dpi="0" rotWithShape="1">
+          <a:blip r:embed="rId2">
+            <a:lum/>
+          </a:blip>
+          <a:srcRect/>
+          <a:stretch>
+            <a:fillRect t="-14000" b="-14000"/>
+          </a:stretch>
+        </a:blipFill>
+        <a:effectLst/>
+      </p:bgPr>
+    </p:bg>
+    <p:spTree>
+      <p:nvGrpSpPr>
+        <p:cNvPr id="1" name=""/>
+        <p:cNvGrpSpPr/>
+        <p:nvPr/>
+      </p:nvGrpSpPr>
+      <p:grpSpPr>
+        <a:xfrm>
+          <a:off x="0" y="0"/>
+          <a:ext cx="0" cy="0"/>
+          <a:chOff x="0" y="0"/>
+          <a:chExt cx="0" cy="0"/>
+        </a:xfrm>
+      </p:grpSpPr>
+      <p:sp>
+        <p:nvSpPr>
+          <p:cNvPr id="2" name="Title 1">
+            <a:extLst>
+              <a:ext uri="{FF2B5EF4-FFF2-40B4-BE49-F238E27FC236}">
+                <a16:creationId xmlns:a16="http://schemas.microsoft.com/office/drawing/2014/main" id="{E8A9D4BE-A95F-46FA-910E-C3294CD5C916}"/>
+              </a:ext>
+            </a:extLst>
+          </p:cNvPr>
+          <p:cNvSpPr>
+            <a:spLocks noGrp="1"/>
+          </p:cNvSpPr>
+          <p:nvPr>
+            <p:ph type="title"/>
+          </p:nvPr>
+        </p:nvSpPr>
+        <p:spPr/>
+        <p:txBody>
+          <a:bodyPr/>
+          <a:lstStyle/>
+          <a:p>
+            <a:r>
+              <a:rPr lang="en-US" dirty="0"/>
+              <a:t>Future Tasks</a:t>
+            </a:r>
+          </a:p>
+        </p:txBody>
+      </p:sp>
+      <p:sp>
+        <p:nvSpPr>
+          <p:cNvPr id="3" name="Content Placeholder 2">
+            <a:extLst>
+              <a:ext uri="{FF2B5EF4-FFF2-40B4-BE49-F238E27FC236}">
+                <a16:creationId xmlns:a16="http://schemas.microsoft.com/office/drawing/2014/main" id="{85AB7D16-8FA8-4A87-8C09-C7C1EF8E70CF}"/>
+              </a:ext>
+            </a:extLst>
+          </p:cNvPr>
+          <p:cNvSpPr>
+            <a:spLocks noGrp="1"/>
+          </p:cNvSpPr>
+          <p:nvPr>
+            <p:ph idx="1"/>
+          </p:nvPr>
+        </p:nvSpPr>
+        <p:spPr/>
+        <p:txBody>
+          <a:bodyPr/>
+          <a:lstStyle/>
+          <a:p>
+            <a:r>
+              <a:rPr lang="en-US" dirty="0"/>
+              <a:t>Defining what it means to be within the range of a planet for small planets</a:t>
+            </a:r>
+          </a:p>
+          <a:p>
+            <a:r>
+              <a:rPr lang="en-US" dirty="0"/>
+              <a:t>Finding a better way to determine the mean anomaly for the current position of a planet as current method only works for Mercury</a:t>
+            </a:r>
+          </a:p>
+          <a:p>
+            <a:r>
+              <a:rPr lang="en-US" dirty="0"/>
+              <a:t>Implementing time variable and UI</a:t>
+            </a:r>
+          </a:p>
+          <a:p>
+            <a:r>
+              <a:rPr lang="en-US" dirty="0"/>
+              <a:t>Eliminating unnecessary angles and adding parallel for efficiency</a:t>
+            </a:r>
+          </a:p>
+        </p:txBody>
+      </p:sp>
+    </p:spTree>
+    <p:extLst>
+      <p:ext uri="{BB962C8B-B14F-4D97-AF65-F5344CB8AC3E}">
+        <p14:creationId xmlns:p14="http://schemas.microsoft.com/office/powerpoint/2010/main" val="2303339528"/>
+      </p:ext>
+    </p:extLst>
+  </p:cSld>
+  <p:clrMapOvr>
+    <a:masterClrMapping/>
+  </p:clrMapOvr>
+</p:sld>
+</file>
+
+<file path=ppt/slides/slide11.xml><?xml version="1.0" encoding="utf-8"?>
+<p:sld xmlns:a="http://schemas.openxmlformats.org/drawingml/2006/main" xmlns:r="http://schemas.openxmlformats.org/officeDocument/2006/relationships" xmlns:p="http://schemas.openxmlformats.org/presentationml/2006/main">
+  <p:cSld>
+    <p:bg>
+      <p:bgPr>
+        <a:blipFill dpi="0" rotWithShape="1">
+          <a:blip r:embed="rId2">
+            <a:lum/>
+          </a:blip>
+          <a:srcRect/>
+          <a:stretch>
+            <a:fillRect t="-14000" b="-14000"/>
+          </a:stretch>
+        </a:blipFill>
+        <a:effectLst/>
+      </p:bgPr>
+    </p:bg>
+    <p:spTree>
+      <p:nvGrpSpPr>
+        <p:cNvPr id="1" name=""/>
+        <p:cNvGrpSpPr/>
+        <p:nvPr/>
+      </p:nvGrpSpPr>
+      <p:grpSpPr>
+        <a:xfrm>
+          <a:off x="0" y="0"/>
+          <a:ext cx="0" cy="0"/>
+          <a:chOff x="0" y="0"/>
+          <a:chExt cx="0" cy="0"/>
+        </a:xfrm>
+      </p:grpSpPr>
+      <p:sp>
+        <p:nvSpPr>
+          <p:cNvPr id="2" name="Title 1">
+            <a:extLst>
+              <a:ext uri="{FF2B5EF4-FFF2-40B4-BE49-F238E27FC236}">
+                <a16:creationId xmlns:a16="http://schemas.microsoft.com/office/drawing/2014/main" id="{E9C44261-86D1-42CE-97C9-3FE3CFB03CC5}"/>
+              </a:ext>
+            </a:extLst>
+          </p:cNvPr>
+          <p:cNvSpPr>
+            <a:spLocks noGrp="1"/>
+          </p:cNvSpPr>
+          <p:nvPr>
+            <p:ph type="title"/>
+          </p:nvPr>
+        </p:nvSpPr>
+        <p:spPr/>
+        <p:txBody>
+          <a:bodyPr/>
+          <a:lstStyle/>
+          <a:p>
+            <a:r>
+              <a:rPr lang="en-US" dirty="0"/>
+              <a:t>References</a:t>
+            </a:r>
+          </a:p>
+        </p:txBody>
+      </p:sp>
+      <p:sp>
+        <p:nvSpPr>
+          <p:cNvPr id="6" name="Content Placeholder 5">
+            <a:extLst>
+              <a:ext uri="{FF2B5EF4-FFF2-40B4-BE49-F238E27FC236}">
+                <a16:creationId xmlns:a16="http://schemas.microsoft.com/office/drawing/2014/main" id="{4728AE23-0E0B-47B5-A330-D34F49809F1B}"/>
+              </a:ext>
+            </a:extLst>
+          </p:cNvPr>
+          <p:cNvSpPr>
+            <a:spLocks noGrp="1"/>
+          </p:cNvSpPr>
+          <p:nvPr>
+            <p:ph idx="1"/>
+          </p:nvPr>
+        </p:nvSpPr>
+        <p:spPr>
+          <a:noFill/>
+        </p:spPr>
+        <p:txBody>
+          <a:bodyPr/>
+          <a:lstStyle/>
+          <a:p>
+            <a:r>
+              <a:rPr lang="en-US" dirty="0"/>
+              <a:t>https://photos.com/featured/earth-view-from-outer-space-background-cybrain.html?product=acrylic-print</a:t>
+            </a:r>
+          </a:p>
+          <a:p>
+            <a:r>
+              <a:rPr lang="en-US" dirty="0"/>
+              <a:t>https://www.researchgate.net/figure/Geometric-interpretation-of-the-fourth-order-Runge-Kutta-method_fig13_299354655</a:t>
+            </a:r>
+          </a:p>
+          <a:p>
+            <a:r>
+              <a:rPr lang="en-US" dirty="0"/>
+              <a:t>https://www.planetary.org/multimedia/space-images/charts/diagram_orbit_ephemeris_definitions.html</a:t>
+            </a:r>
+          </a:p>
+        </p:txBody>
+      </p:sp>
+    </p:spTree>
+    <p:extLst>
+      <p:ext uri="{BB962C8B-B14F-4D97-AF65-F5344CB8AC3E}">
+        <p14:creationId xmlns:p14="http://schemas.microsoft.com/office/powerpoint/2010/main" val="2804585550"/>
+      </p:ext>
+    </p:extLst>
+  </p:cSld>
+  <p:clrMapOvr>
+    <a:masterClrMapping/>
+  </p:clrMapOvr>
+</p:sld>
+</file>
+
 <file path=ppt/slides/slide2.xml><?xml version="1.0" encoding="utf-8"?>
 <p:sld xmlns:a="http://schemas.openxmlformats.org/drawingml/2006/main" xmlns:r="http://schemas.openxmlformats.org/officeDocument/2006/relationships" xmlns:p="http://schemas.openxmlformats.org/presentationml/2006/main">
   <p:cSld>
@@ -3442,7 +3681,7 @@
           <a:p>
             <a:r>
               <a:rPr lang="en-US" sz="4000" dirty="0"/>
-              <a:t>By programming time-step algorithms and applying it to spacecraft and planets over a time period, the closest to present date and angle for a launch that takes you to a specified planet can be accurately and efficiently calculated.</a:t>
+              <a:t>By programming time-step algorithms and applying it to spacecraft and planets over a time period, the closest to present date and angle for a launch that takes you to a specified planet in the minimum amount of time can be accurately and efficiently calculated.</a:t>
             </a:r>
           </a:p>
         </p:txBody>
@@ -3496,7 +3735,7 @@
           <p:cNvPr id="2" name="Title 1">
             <a:extLst>
               <a:ext uri="{FF2B5EF4-FFF2-40B4-BE49-F238E27FC236}">
-                <a16:creationId xmlns:a16="http://schemas.microsoft.com/office/drawing/2014/main" id="{E9C44261-86D1-42CE-97C9-3FE3CFB03CC5}"/>
+                <a16:creationId xmlns:a16="http://schemas.microsoft.com/office/drawing/2014/main" id="{DE1C2B47-5773-4253-B8DC-D2DBA0EA7788}"/>
               </a:ext>
             </a:extLst>
           </p:cNvPr>
@@ -3514,17 +3753,17 @@
           <a:p>
             <a:r>
               <a:rPr lang="en-US" dirty="0"/>
-              <a:t>References</a:t>
-            </a:r>
-          </a:p>
-        </p:txBody>
-      </p:sp>
-      <p:sp>
-        <p:nvSpPr>
-          <p:cNvPr id="6" name="Content Placeholder 5">
+              <a:t>Orbit Calculation</a:t>
+            </a:r>
+          </a:p>
+        </p:txBody>
+      </p:sp>
+      <p:sp>
+        <p:nvSpPr>
+          <p:cNvPr id="3" name="Content Placeholder 2">
             <a:extLst>
               <a:ext uri="{FF2B5EF4-FFF2-40B4-BE49-F238E27FC236}">
-                <a16:creationId xmlns:a16="http://schemas.microsoft.com/office/drawing/2014/main" id="{4728AE23-0E0B-47B5-A330-D34F49809F1B}"/>
+                <a16:creationId xmlns:a16="http://schemas.microsoft.com/office/drawing/2014/main" id="{B675CE44-75F3-4F2F-8BCA-F2DA46B3B764}"/>
               </a:ext>
             </a:extLst>
           </p:cNvPr>
@@ -3535,16 +3774,20 @@
             <p:ph idx="1"/>
           </p:nvPr>
         </p:nvSpPr>
-        <p:spPr>
-          <a:noFill/>
-        </p:spPr>
+        <p:spPr/>
         <p:txBody>
           <a:bodyPr/>
           <a:lstStyle/>
           <a:p>
             <a:r>
               <a:rPr lang="en-US" dirty="0"/>
-              <a:t>https://photos.com/featured/earth-view-from-outer-space-background-cybrain.html?product=acrylic-print</a:t>
+              <a:t>Newton-Raphson Method that uses Keplerian elements as parameters to calculate the angular change of an object in orbit relative to the object its orbiting</a:t>
+            </a:r>
+          </a:p>
+          <a:p>
+            <a:r>
+              <a:rPr lang="en-US" dirty="0"/>
+              <a:t>Used starting position from NASA’s database to find starting angular position of a planet in its orbit relative to the sun</a:t>
             </a:r>
           </a:p>
         </p:txBody>
@@ -3552,7 +3795,499 @@
     </p:spTree>
     <p:extLst>
       <p:ext uri="{BB962C8B-B14F-4D97-AF65-F5344CB8AC3E}">
-        <p14:creationId xmlns:p14="http://schemas.microsoft.com/office/powerpoint/2010/main" val="2804585550"/>
+        <p14:creationId xmlns:p14="http://schemas.microsoft.com/office/powerpoint/2010/main" val="3385749872"/>
+      </p:ext>
+    </p:extLst>
+  </p:cSld>
+  <p:clrMapOvr>
+    <a:masterClrMapping/>
+  </p:clrMapOvr>
+</p:sld>
+</file>
+
+<file path=ppt/slides/slide5.xml><?xml version="1.0" encoding="utf-8"?>
+<p:sld xmlns:a="http://schemas.openxmlformats.org/drawingml/2006/main" xmlns:r="http://schemas.openxmlformats.org/officeDocument/2006/relationships" xmlns:p="http://schemas.openxmlformats.org/presentationml/2006/main">
+  <p:cSld>
+    <p:bg>
+      <p:bgPr>
+        <a:blipFill dpi="0" rotWithShape="1">
+          <a:blip r:embed="rId2">
+            <a:lum/>
+          </a:blip>
+          <a:srcRect/>
+          <a:stretch>
+            <a:fillRect t="-14000" b="-14000"/>
+          </a:stretch>
+        </a:blipFill>
+        <a:effectLst/>
+      </p:bgPr>
+    </p:bg>
+    <p:spTree>
+      <p:nvGrpSpPr>
+        <p:cNvPr id="1" name=""/>
+        <p:cNvGrpSpPr/>
+        <p:nvPr/>
+      </p:nvGrpSpPr>
+      <p:grpSpPr>
+        <a:xfrm>
+          <a:off x="0" y="0"/>
+          <a:ext cx="0" cy="0"/>
+          <a:chOff x="0" y="0"/>
+          <a:chExt cx="0" cy="0"/>
+        </a:xfrm>
+      </p:grpSpPr>
+      <p:pic>
+        <p:nvPicPr>
+          <p:cNvPr id="4" name="Picture 3">
+            <a:extLst>
+              <a:ext uri="{FF2B5EF4-FFF2-40B4-BE49-F238E27FC236}">
+                <a16:creationId xmlns:a16="http://schemas.microsoft.com/office/drawing/2014/main" id="{DCEE45C4-56DC-4DE1-B9D2-1C3F0552FD5D}"/>
+              </a:ext>
+            </a:extLst>
+          </p:cNvPr>
+          <p:cNvPicPr>
+            <a:picLocks noChangeAspect="1"/>
+          </p:cNvPicPr>
+          <p:nvPr/>
+        </p:nvPicPr>
+        <p:blipFill>
+          <a:blip r:embed="rId3"/>
+          <a:stretch>
+            <a:fillRect/>
+          </a:stretch>
+        </p:blipFill>
+        <p:spPr>
+          <a:xfrm>
+            <a:off x="1333500" y="1307005"/>
+            <a:ext cx="4762500" cy="4286250"/>
+          </a:xfrm>
+          <a:prstGeom prst="rect">
+            <a:avLst/>
+          </a:prstGeom>
+        </p:spPr>
+      </p:pic>
+      <p:pic>
+        <p:nvPicPr>
+          <p:cNvPr id="5" name="Picture 4">
+            <a:extLst>
+              <a:ext uri="{FF2B5EF4-FFF2-40B4-BE49-F238E27FC236}">
+                <a16:creationId xmlns:a16="http://schemas.microsoft.com/office/drawing/2014/main" id="{96DD0EFE-20B4-4965-852F-242B949DB7CA}"/>
+              </a:ext>
+            </a:extLst>
+          </p:cNvPr>
+          <p:cNvPicPr>
+            <a:picLocks noChangeAspect="1"/>
+          </p:cNvPicPr>
+          <p:nvPr/>
+        </p:nvPicPr>
+        <p:blipFill>
+          <a:blip r:embed="rId4"/>
+          <a:stretch>
+            <a:fillRect/>
+          </a:stretch>
+        </p:blipFill>
+        <p:spPr>
+          <a:xfrm>
+            <a:off x="7451431" y="1285875"/>
+            <a:ext cx="3651250" cy="4286250"/>
+          </a:xfrm>
+          <a:prstGeom prst="rect">
+            <a:avLst/>
+          </a:prstGeom>
+        </p:spPr>
+      </p:pic>
+    </p:spTree>
+    <p:extLst>
+      <p:ext uri="{BB962C8B-B14F-4D97-AF65-F5344CB8AC3E}">
+        <p14:creationId xmlns:p14="http://schemas.microsoft.com/office/powerpoint/2010/main" val="3848679784"/>
+      </p:ext>
+    </p:extLst>
+  </p:cSld>
+  <p:clrMapOvr>
+    <a:masterClrMapping/>
+  </p:clrMapOvr>
+</p:sld>
+</file>
+
+<file path=ppt/slides/slide6.xml><?xml version="1.0" encoding="utf-8"?>
+<p:sld xmlns:a="http://schemas.openxmlformats.org/drawingml/2006/main" xmlns:r="http://schemas.openxmlformats.org/officeDocument/2006/relationships" xmlns:p="http://schemas.openxmlformats.org/presentationml/2006/main">
+  <p:cSld>
+    <p:bg>
+      <p:bgPr>
+        <a:blipFill dpi="0" rotWithShape="1">
+          <a:blip r:embed="rId2">
+            <a:lum/>
+          </a:blip>
+          <a:srcRect/>
+          <a:stretch>
+            <a:fillRect t="-14000" b="-14000"/>
+          </a:stretch>
+        </a:blipFill>
+        <a:effectLst/>
+      </p:bgPr>
+    </p:bg>
+    <p:spTree>
+      <p:nvGrpSpPr>
+        <p:cNvPr id="1" name=""/>
+        <p:cNvGrpSpPr/>
+        <p:nvPr/>
+      </p:nvGrpSpPr>
+      <p:grpSpPr>
+        <a:xfrm>
+          <a:off x="0" y="0"/>
+          <a:ext cx="0" cy="0"/>
+          <a:chOff x="0" y="0"/>
+          <a:chExt cx="0" cy="0"/>
+        </a:xfrm>
+      </p:grpSpPr>
+      <p:pic>
+        <p:nvPicPr>
+          <p:cNvPr id="5" name="Content Placeholder 4">
+            <a:extLst>
+              <a:ext uri="{FF2B5EF4-FFF2-40B4-BE49-F238E27FC236}">
+                <a16:creationId xmlns:a16="http://schemas.microsoft.com/office/drawing/2014/main" id="{A17896F1-7340-447A-9561-00A312724C3E}"/>
+              </a:ext>
+            </a:extLst>
+          </p:cNvPr>
+          <p:cNvPicPr>
+            <a:picLocks noGrp="1" noChangeAspect="1"/>
+          </p:cNvPicPr>
+          <p:nvPr>
+            <p:ph idx="1"/>
+          </p:nvPr>
+        </p:nvPicPr>
+        <p:blipFill>
+          <a:blip r:embed="rId3">
+            <a:extLst>
+              <a:ext uri="{28A0092B-C50C-407E-A947-70E740481C1C}">
+                <a14:useLocalDpi xmlns:a14="http://schemas.microsoft.com/office/drawing/2010/main" val="0"/>
+              </a:ext>
+            </a:extLst>
+          </a:blip>
+          <a:stretch>
+            <a:fillRect/>
+          </a:stretch>
+        </p:blipFill>
+        <p:spPr>
+          <a:xfrm>
+            <a:off x="1064705" y="0"/>
+            <a:ext cx="10062590" cy="2961564"/>
+          </a:xfrm>
+        </p:spPr>
+      </p:pic>
+      <p:pic>
+        <p:nvPicPr>
+          <p:cNvPr id="7" name="Picture 6" descr="A screenshot of a cell phone&#10;&#10;Description automatically generated">
+            <a:extLst>
+              <a:ext uri="{FF2B5EF4-FFF2-40B4-BE49-F238E27FC236}">
+                <a16:creationId xmlns:a16="http://schemas.microsoft.com/office/drawing/2014/main" id="{7F16E95E-FA34-47C4-92DA-28B06EC889CE}"/>
+              </a:ext>
+            </a:extLst>
+          </p:cNvPr>
+          <p:cNvPicPr>
+            <a:picLocks noChangeAspect="1"/>
+          </p:cNvPicPr>
+          <p:nvPr/>
+        </p:nvPicPr>
+        <p:blipFill>
+          <a:blip r:embed="rId4">
+            <a:extLst>
+              <a:ext uri="{28A0092B-C50C-407E-A947-70E740481C1C}">
+                <a14:useLocalDpi xmlns:a14="http://schemas.microsoft.com/office/drawing/2010/main" val="0"/>
+              </a:ext>
+            </a:extLst>
+          </a:blip>
+          <a:stretch>
+            <a:fillRect/>
+          </a:stretch>
+        </p:blipFill>
+        <p:spPr>
+          <a:xfrm>
+            <a:off x="3177215" y="2961564"/>
+            <a:ext cx="5837569" cy="3896436"/>
+          </a:xfrm>
+          <a:prstGeom prst="rect">
+            <a:avLst/>
+          </a:prstGeom>
+        </p:spPr>
+      </p:pic>
+    </p:spTree>
+    <p:extLst>
+      <p:ext uri="{BB962C8B-B14F-4D97-AF65-F5344CB8AC3E}">
+        <p14:creationId xmlns:p14="http://schemas.microsoft.com/office/powerpoint/2010/main" val="2870930434"/>
+      </p:ext>
+    </p:extLst>
+  </p:cSld>
+  <p:clrMapOvr>
+    <a:masterClrMapping/>
+  </p:clrMapOvr>
+</p:sld>
+</file>
+
+<file path=ppt/slides/slide7.xml><?xml version="1.0" encoding="utf-8"?>
+<p:sld xmlns:a="http://schemas.openxmlformats.org/drawingml/2006/main" xmlns:r="http://schemas.openxmlformats.org/officeDocument/2006/relationships" xmlns:p="http://schemas.openxmlformats.org/presentationml/2006/main">
+  <p:cSld>
+    <p:bg>
+      <p:bgPr>
+        <a:blipFill dpi="0" rotWithShape="1">
+          <a:blip r:embed="rId2">
+            <a:lum/>
+          </a:blip>
+          <a:srcRect/>
+          <a:stretch>
+            <a:fillRect t="-14000" b="-14000"/>
+          </a:stretch>
+        </a:blipFill>
+        <a:effectLst/>
+      </p:bgPr>
+    </p:bg>
+    <p:spTree>
+      <p:nvGrpSpPr>
+        <p:cNvPr id="1" name=""/>
+        <p:cNvGrpSpPr/>
+        <p:nvPr/>
+      </p:nvGrpSpPr>
+      <p:grpSpPr>
+        <a:xfrm>
+          <a:off x="0" y="0"/>
+          <a:ext cx="0" cy="0"/>
+          <a:chOff x="0" y="0"/>
+          <a:chExt cx="0" cy="0"/>
+        </a:xfrm>
+      </p:grpSpPr>
+      <p:sp>
+        <p:nvSpPr>
+          <p:cNvPr id="2" name="Title 1">
+            <a:extLst>
+              <a:ext uri="{FF2B5EF4-FFF2-40B4-BE49-F238E27FC236}">
+                <a16:creationId xmlns:a16="http://schemas.microsoft.com/office/drawing/2014/main" id="{4ECDCCF6-FC9D-43F0-B347-B6EEFE4CD5C8}"/>
+              </a:ext>
+            </a:extLst>
+          </p:cNvPr>
+          <p:cNvSpPr>
+            <a:spLocks noGrp="1"/>
+          </p:cNvSpPr>
+          <p:nvPr>
+            <p:ph type="title"/>
+          </p:nvPr>
+        </p:nvSpPr>
+        <p:spPr/>
+        <p:txBody>
+          <a:bodyPr/>
+          <a:lstStyle/>
+          <a:p>
+            <a:r>
+              <a:rPr lang="en-US" dirty="0"/>
+              <a:t>Spacecraft Calculation</a:t>
+            </a:r>
+          </a:p>
+        </p:txBody>
+      </p:sp>
+      <p:sp>
+        <p:nvSpPr>
+          <p:cNvPr id="3" name="Content Placeholder 2">
+            <a:extLst>
+              <a:ext uri="{FF2B5EF4-FFF2-40B4-BE49-F238E27FC236}">
+                <a16:creationId xmlns:a16="http://schemas.microsoft.com/office/drawing/2014/main" id="{BA9B378F-E04F-4E4B-B088-5BFB6469A63E}"/>
+              </a:ext>
+            </a:extLst>
+          </p:cNvPr>
+          <p:cNvSpPr>
+            <a:spLocks noGrp="1"/>
+          </p:cNvSpPr>
+          <p:nvPr>
+            <p:ph idx="1"/>
+          </p:nvPr>
+        </p:nvSpPr>
+        <p:spPr/>
+        <p:txBody>
+          <a:bodyPr/>
+          <a:lstStyle/>
+          <a:p>
+            <a:r>
+              <a:rPr lang="en-US" dirty="0"/>
+              <a:t>Initial speed of spacecraft on verge of leaving a planet found from Apollo moon mission data along with gravitational field at that point</a:t>
+            </a:r>
+          </a:p>
+          <a:p>
+            <a:r>
+              <a:rPr lang="en-US" dirty="0"/>
+              <a:t>This strength of that g field will be used to determine if a rocket has reached a planet</a:t>
+            </a:r>
+          </a:p>
+          <a:p>
+            <a:r>
+              <a:rPr lang="en-US" dirty="0"/>
+              <a:t>Fourth-order </a:t>
+            </a:r>
+            <a:r>
+              <a:rPr lang="en-US" dirty="0" err="1"/>
+              <a:t>runge-kutta</a:t>
+            </a:r>
+            <a:r>
+              <a:rPr lang="en-US" dirty="0"/>
+              <a:t> method of numeric integration allows for greater accuracy than just using the universal law of gravitation</a:t>
+            </a:r>
+          </a:p>
+          <a:p>
+            <a:endParaRPr lang="en-US" dirty="0"/>
+          </a:p>
+        </p:txBody>
+      </p:sp>
+    </p:spTree>
+    <p:extLst>
+      <p:ext uri="{BB962C8B-B14F-4D97-AF65-F5344CB8AC3E}">
+        <p14:creationId xmlns:p14="http://schemas.microsoft.com/office/powerpoint/2010/main" val="1899174648"/>
+      </p:ext>
+    </p:extLst>
+  </p:cSld>
+  <p:clrMapOvr>
+    <a:masterClrMapping/>
+  </p:clrMapOvr>
+</p:sld>
+</file>
+
+<file path=ppt/slides/slide8.xml><?xml version="1.0" encoding="utf-8"?>
+<p:sld xmlns:a="http://schemas.openxmlformats.org/drawingml/2006/main" xmlns:r="http://schemas.openxmlformats.org/officeDocument/2006/relationships" xmlns:p="http://schemas.openxmlformats.org/presentationml/2006/main">
+  <p:cSld>
+    <p:bg>
+      <p:bgPr>
+        <a:blipFill dpi="0" rotWithShape="1">
+          <a:blip r:embed="rId2">
+            <a:lum/>
+          </a:blip>
+          <a:srcRect/>
+          <a:stretch>
+            <a:fillRect t="-14000" b="-14000"/>
+          </a:stretch>
+        </a:blipFill>
+        <a:effectLst/>
+      </p:bgPr>
+    </p:bg>
+    <p:spTree>
+      <p:nvGrpSpPr>
+        <p:cNvPr id="1" name=""/>
+        <p:cNvGrpSpPr/>
+        <p:nvPr/>
+      </p:nvGrpSpPr>
+      <p:grpSpPr>
+        <a:xfrm>
+          <a:off x="0" y="0"/>
+          <a:ext cx="0" cy="0"/>
+          <a:chOff x="0" y="0"/>
+          <a:chExt cx="0" cy="0"/>
+        </a:xfrm>
+      </p:grpSpPr>
+      <p:pic>
+        <p:nvPicPr>
+          <p:cNvPr id="4" name="Content Placeholder 3">
+            <a:extLst>
+              <a:ext uri="{FF2B5EF4-FFF2-40B4-BE49-F238E27FC236}">
+                <a16:creationId xmlns:a16="http://schemas.microsoft.com/office/drawing/2014/main" id="{456BE3A4-DB6B-45AD-9463-3C58B7413058}"/>
+              </a:ext>
+            </a:extLst>
+          </p:cNvPr>
+          <p:cNvPicPr>
+            <a:picLocks noGrp="1" noChangeAspect="1"/>
+          </p:cNvPicPr>
+          <p:nvPr>
+            <p:ph idx="1"/>
+          </p:nvPr>
+        </p:nvPicPr>
+        <p:blipFill>
+          <a:blip r:embed="rId3"/>
+          <a:stretch>
+            <a:fillRect/>
+          </a:stretch>
+        </p:blipFill>
+        <p:spPr>
+          <a:xfrm>
+            <a:off x="2720775" y="868485"/>
+            <a:ext cx="6750449" cy="5121030"/>
+          </a:xfrm>
+          <a:prstGeom prst="rect">
+            <a:avLst/>
+          </a:prstGeom>
+        </p:spPr>
+      </p:pic>
+    </p:spTree>
+    <p:extLst>
+      <p:ext uri="{BB962C8B-B14F-4D97-AF65-F5344CB8AC3E}">
+        <p14:creationId xmlns:p14="http://schemas.microsoft.com/office/powerpoint/2010/main" val="2726195733"/>
+      </p:ext>
+    </p:extLst>
+  </p:cSld>
+  <p:clrMapOvr>
+    <a:masterClrMapping/>
+  </p:clrMapOvr>
+</p:sld>
+</file>
+
+<file path=ppt/slides/slide9.xml><?xml version="1.0" encoding="utf-8"?>
+<p:sld xmlns:a="http://schemas.openxmlformats.org/drawingml/2006/main" xmlns:r="http://schemas.openxmlformats.org/officeDocument/2006/relationships" xmlns:p="http://schemas.openxmlformats.org/presentationml/2006/main">
+  <p:cSld>
+    <p:bg>
+      <p:bgPr>
+        <a:blipFill dpi="0" rotWithShape="1">
+          <a:blip r:embed="rId2">
+            <a:lum/>
+          </a:blip>
+          <a:srcRect/>
+          <a:stretch>
+            <a:fillRect t="-14000" b="-14000"/>
+          </a:stretch>
+        </a:blipFill>
+        <a:effectLst/>
+      </p:bgPr>
+    </p:bg>
+    <p:spTree>
+      <p:nvGrpSpPr>
+        <p:cNvPr id="1" name=""/>
+        <p:cNvGrpSpPr/>
+        <p:nvPr/>
+      </p:nvGrpSpPr>
+      <p:grpSpPr>
+        <a:xfrm>
+          <a:off x="0" y="0"/>
+          <a:ext cx="0" cy="0"/>
+          <a:chOff x="0" y="0"/>
+          <a:chExt cx="0" cy="0"/>
+        </a:xfrm>
+      </p:grpSpPr>
+      <p:pic>
+        <p:nvPicPr>
+          <p:cNvPr id="4" name="Picture 3">
+            <a:extLst>
+              <a:ext uri="{FF2B5EF4-FFF2-40B4-BE49-F238E27FC236}">
+                <a16:creationId xmlns:a16="http://schemas.microsoft.com/office/drawing/2014/main" id="{D9337F3E-A844-409B-A36B-DB8F8914A103}"/>
+              </a:ext>
+            </a:extLst>
+          </p:cNvPr>
+          <p:cNvPicPr>
+            <a:picLocks noChangeAspect="1"/>
+          </p:cNvPicPr>
+          <p:nvPr/>
+        </p:nvPicPr>
+        <p:blipFill>
+          <a:blip r:embed="rId3"/>
+          <a:stretch>
+            <a:fillRect/>
+          </a:stretch>
+        </p:blipFill>
+        <p:spPr>
+          <a:xfrm>
+            <a:off x="2026517" y="982980"/>
+            <a:ext cx="8138966" cy="4892039"/>
+          </a:xfrm>
+          <a:prstGeom prst="rect">
+            <a:avLst/>
+          </a:prstGeom>
+        </p:spPr>
+      </p:pic>
+    </p:spTree>
+    <p:extLst>
+      <p:ext uri="{BB962C8B-B14F-4D97-AF65-F5344CB8AC3E}">
+        <p14:creationId xmlns:p14="http://schemas.microsoft.com/office/powerpoint/2010/main" val="3571897027"/>
       </p:ext>
     </p:extLst>
   </p:cSld>

</xml_diff>

<commit_message>
final touchups before parallel
</commit_message>
<xml_diff>
--- a/Presentation/Junyan_Peng_Presentation.pptx
+++ b/Presentation/Junyan_Peng_Presentation.pptx
@@ -14,8 +14,11 @@
     <p:sldId id="262" r:id="rId8"/>
     <p:sldId id="264" r:id="rId9"/>
     <p:sldId id="268" r:id="rId10"/>
-    <p:sldId id="267" r:id="rId11"/>
-    <p:sldId id="260" r:id="rId12"/>
+    <p:sldId id="269" r:id="rId11"/>
+    <p:sldId id="267" r:id="rId12"/>
+    <p:sldId id="260" r:id="rId13"/>
+    <p:sldId id="270" r:id="rId14"/>
+    <p:sldId id="271" r:id="rId15"/>
   </p:sldIdLst>
   <p:sldSz cx="12192000" cy="6858000"/>
   <p:notesSz cx="6858000" cy="9144000"/>
@@ -253,7 +256,7 @@
           <a:p>
             <a:fld id="{92F6D378-F839-4F94-B173-FB3F4DF6F29B}" type="datetimeFigureOut">
               <a:rPr lang="en-US" smtClean="0"/>
-              <a:t>2/6/2020</a:t>
+              <a:t>4/25/2020</a:t>
             </a:fld>
             <a:endParaRPr lang="en-US"/>
           </a:p>
@@ -423,7 +426,7 @@
           <a:p>
             <a:fld id="{92F6D378-F839-4F94-B173-FB3F4DF6F29B}" type="datetimeFigureOut">
               <a:rPr lang="en-US" smtClean="0"/>
-              <a:t>2/6/2020</a:t>
+              <a:t>4/25/2020</a:t>
             </a:fld>
             <a:endParaRPr lang="en-US"/>
           </a:p>
@@ -603,7 +606,7 @@
           <a:p>
             <a:fld id="{92F6D378-F839-4F94-B173-FB3F4DF6F29B}" type="datetimeFigureOut">
               <a:rPr lang="en-US" smtClean="0"/>
-              <a:t>2/6/2020</a:t>
+              <a:t>4/25/2020</a:t>
             </a:fld>
             <a:endParaRPr lang="en-US"/>
           </a:p>
@@ -773,7 +776,7 @@
           <a:p>
             <a:fld id="{92F6D378-F839-4F94-B173-FB3F4DF6F29B}" type="datetimeFigureOut">
               <a:rPr lang="en-US" smtClean="0"/>
-              <a:t>2/6/2020</a:t>
+              <a:t>4/25/2020</a:t>
             </a:fld>
             <a:endParaRPr lang="en-US"/>
           </a:p>
@@ -1019,7 +1022,7 @@
           <a:p>
             <a:fld id="{92F6D378-F839-4F94-B173-FB3F4DF6F29B}" type="datetimeFigureOut">
               <a:rPr lang="en-US" smtClean="0"/>
-              <a:t>2/6/2020</a:t>
+              <a:t>4/25/2020</a:t>
             </a:fld>
             <a:endParaRPr lang="en-US"/>
           </a:p>
@@ -1251,7 +1254,7 @@
           <a:p>
             <a:fld id="{92F6D378-F839-4F94-B173-FB3F4DF6F29B}" type="datetimeFigureOut">
               <a:rPr lang="en-US" smtClean="0"/>
-              <a:t>2/6/2020</a:t>
+              <a:t>4/25/2020</a:t>
             </a:fld>
             <a:endParaRPr lang="en-US"/>
           </a:p>
@@ -1618,7 +1621,7 @@
           <a:p>
             <a:fld id="{92F6D378-F839-4F94-B173-FB3F4DF6F29B}" type="datetimeFigureOut">
               <a:rPr lang="en-US" smtClean="0"/>
-              <a:t>2/6/2020</a:t>
+              <a:t>4/25/2020</a:t>
             </a:fld>
             <a:endParaRPr lang="en-US"/>
           </a:p>
@@ -1736,7 +1739,7 @@
           <a:p>
             <a:fld id="{92F6D378-F839-4F94-B173-FB3F4DF6F29B}" type="datetimeFigureOut">
               <a:rPr lang="en-US" smtClean="0"/>
-              <a:t>2/6/2020</a:t>
+              <a:t>4/25/2020</a:t>
             </a:fld>
             <a:endParaRPr lang="en-US"/>
           </a:p>
@@ -1831,7 +1834,7 @@
           <a:p>
             <a:fld id="{92F6D378-F839-4F94-B173-FB3F4DF6F29B}" type="datetimeFigureOut">
               <a:rPr lang="en-US" smtClean="0"/>
-              <a:t>2/6/2020</a:t>
+              <a:t>4/25/2020</a:t>
             </a:fld>
             <a:endParaRPr lang="en-US"/>
           </a:p>
@@ -2108,7 +2111,7 @@
           <a:p>
             <a:fld id="{92F6D378-F839-4F94-B173-FB3F4DF6F29B}" type="datetimeFigureOut">
               <a:rPr lang="en-US" smtClean="0"/>
-              <a:t>2/6/2020</a:t>
+              <a:t>4/25/2020</a:t>
             </a:fld>
             <a:endParaRPr lang="en-US"/>
           </a:p>
@@ -2365,7 +2368,7 @@
           <a:p>
             <a:fld id="{92F6D378-F839-4F94-B173-FB3F4DF6F29B}" type="datetimeFigureOut">
               <a:rPr lang="en-US" smtClean="0"/>
-              <a:t>2/6/2020</a:t>
+              <a:t>4/25/2020</a:t>
             </a:fld>
             <a:endParaRPr lang="en-US"/>
           </a:p>
@@ -2578,7 +2581,7 @@
           <a:p>
             <a:fld id="{92F6D378-F839-4F94-B173-FB3F4DF6F29B}" type="datetimeFigureOut">
               <a:rPr lang="en-US" smtClean="0"/>
-              <a:t>2/6/2020</a:t>
+              <a:t>4/25/2020</a:t>
             </a:fld>
             <a:endParaRPr lang="en-US"/>
           </a:p>
@@ -3112,7 +3115,7 @@
           <p:cNvPr id="2" name="Title 1">
             <a:extLst>
               <a:ext uri="{FF2B5EF4-FFF2-40B4-BE49-F238E27FC236}">
-                <a16:creationId xmlns:a16="http://schemas.microsoft.com/office/drawing/2014/main" id="{E8A9D4BE-A95F-46FA-910E-C3294CD5C916}"/>
+                <a16:creationId xmlns:a16="http://schemas.microsoft.com/office/drawing/2014/main" id="{EDA61D9F-84C0-423D-815D-598EBE31578F}"/>
               </a:ext>
             </a:extLst>
           </p:cNvPr>
@@ -3130,7 +3133,7 @@
           <a:p>
             <a:r>
               <a:rPr lang="en-US" dirty="0"/>
-              <a:t>Future Tasks</a:t>
+              <a:t>Parallel Computing</a:t>
             </a:r>
           </a:p>
         </p:txBody>
@@ -3140,7 +3143,7 @@
           <p:cNvPr id="3" name="Content Placeholder 2">
             <a:extLst>
               <a:ext uri="{FF2B5EF4-FFF2-40B4-BE49-F238E27FC236}">
-                <a16:creationId xmlns:a16="http://schemas.microsoft.com/office/drawing/2014/main" id="{85AB7D16-8FA8-4A87-8C09-C7C1EF8E70CF}"/>
+                <a16:creationId xmlns:a16="http://schemas.microsoft.com/office/drawing/2014/main" id="{E7E45949-F02B-4EA5-8BA0-E53E63F8E2CE}"/>
               </a:ext>
             </a:extLst>
           </p:cNvPr>
@@ -3158,33 +3161,26 @@
           <a:p>
             <a:r>
               <a:rPr lang="en-US" dirty="0"/>
-              <a:t>Defining what it means to be within the range of a planet for small planets</a:t>
+              <a:t>Divided cores based on time frame</a:t>
             </a:r>
           </a:p>
           <a:p>
             <a:r>
               <a:rPr lang="en-US" dirty="0"/>
-              <a:t>Finding a better way to determine the mean anomaly for the current position of a planet as current method only works for Mercury</a:t>
-            </a:r>
-          </a:p>
-          <a:p>
-            <a:r>
-              <a:rPr lang="en-US" dirty="0"/>
-              <a:t>Implementing time variable and UI</a:t>
-            </a:r>
-          </a:p>
-          <a:p>
-            <a:r>
-              <a:rPr lang="en-US" dirty="0"/>
-              <a:t>Eliminating unnecessary angles and adding parallel for efficiency</a:t>
-            </a:r>
+              <a:t>Further divisions based on various angles </a:t>
+            </a:r>
+            <a:r>
+              <a:rPr lang="en-US"/>
+              <a:t>of launch</a:t>
+            </a:r>
+            <a:endParaRPr lang="en-US" dirty="0"/>
           </a:p>
         </p:txBody>
       </p:sp>
     </p:spTree>
     <p:extLst>
       <p:ext uri="{BB962C8B-B14F-4D97-AF65-F5344CB8AC3E}">
-        <p14:creationId xmlns:p14="http://schemas.microsoft.com/office/powerpoint/2010/main" val="2303339528"/>
+        <p14:creationId xmlns:p14="http://schemas.microsoft.com/office/powerpoint/2010/main" val="735374671"/>
       </p:ext>
     </p:extLst>
   </p:cSld>
@@ -3230,6 +3226,124 @@
           <p:cNvPr id="2" name="Title 1">
             <a:extLst>
               <a:ext uri="{FF2B5EF4-FFF2-40B4-BE49-F238E27FC236}">
+                <a16:creationId xmlns:a16="http://schemas.microsoft.com/office/drawing/2014/main" id="{E8A9D4BE-A95F-46FA-910E-C3294CD5C916}"/>
+              </a:ext>
+            </a:extLst>
+          </p:cNvPr>
+          <p:cNvSpPr>
+            <a:spLocks noGrp="1"/>
+          </p:cNvSpPr>
+          <p:nvPr>
+            <p:ph type="title"/>
+          </p:nvPr>
+        </p:nvSpPr>
+        <p:spPr/>
+        <p:txBody>
+          <a:bodyPr/>
+          <a:lstStyle/>
+          <a:p>
+            <a:r>
+              <a:rPr lang="en-US" dirty="0"/>
+              <a:t>Future Tasks</a:t>
+            </a:r>
+          </a:p>
+        </p:txBody>
+      </p:sp>
+      <p:sp>
+        <p:nvSpPr>
+          <p:cNvPr id="3" name="Content Placeholder 2">
+            <a:extLst>
+              <a:ext uri="{FF2B5EF4-FFF2-40B4-BE49-F238E27FC236}">
+                <a16:creationId xmlns:a16="http://schemas.microsoft.com/office/drawing/2014/main" id="{85AB7D16-8FA8-4A87-8C09-C7C1EF8E70CF}"/>
+              </a:ext>
+            </a:extLst>
+          </p:cNvPr>
+          <p:cNvSpPr>
+            <a:spLocks noGrp="1"/>
+          </p:cNvSpPr>
+          <p:nvPr>
+            <p:ph idx="1"/>
+          </p:nvPr>
+        </p:nvSpPr>
+        <p:spPr/>
+        <p:txBody>
+          <a:bodyPr/>
+          <a:lstStyle/>
+          <a:p>
+            <a:r>
+              <a:rPr lang="en-US" dirty="0"/>
+              <a:t>Finding a better way to determine the mean anomaly for the current position of a planet as current method only works for Mercury</a:t>
+            </a:r>
+          </a:p>
+          <a:p>
+            <a:r>
+              <a:rPr lang="en-US" dirty="0"/>
+              <a:t>Implementing time variable and UI</a:t>
+            </a:r>
+          </a:p>
+          <a:p>
+            <a:r>
+              <a:rPr lang="en-US" dirty="0"/>
+              <a:t>Eliminating unnecessary angles and adding parallel for efficiency</a:t>
+            </a:r>
+          </a:p>
+          <a:p>
+            <a:pPr marL="0" indent="0">
+              <a:buNone/>
+            </a:pPr>
+            <a:endParaRPr lang="en-US" dirty="0"/>
+          </a:p>
+        </p:txBody>
+      </p:sp>
+    </p:spTree>
+    <p:extLst>
+      <p:ext uri="{BB962C8B-B14F-4D97-AF65-F5344CB8AC3E}">
+        <p14:creationId xmlns:p14="http://schemas.microsoft.com/office/powerpoint/2010/main" val="2303339528"/>
+      </p:ext>
+    </p:extLst>
+  </p:cSld>
+  <p:clrMapOvr>
+    <a:masterClrMapping/>
+  </p:clrMapOvr>
+</p:sld>
+</file>
+
+<file path=ppt/slides/slide12.xml><?xml version="1.0" encoding="utf-8"?>
+<p:sld xmlns:a="http://schemas.openxmlformats.org/drawingml/2006/main" xmlns:r="http://schemas.openxmlformats.org/officeDocument/2006/relationships" xmlns:p="http://schemas.openxmlformats.org/presentationml/2006/main">
+  <p:cSld>
+    <p:bg>
+      <p:bgPr>
+        <a:blipFill dpi="0" rotWithShape="1">
+          <a:blip r:embed="rId2">
+            <a:lum/>
+          </a:blip>
+          <a:srcRect/>
+          <a:stretch>
+            <a:fillRect t="-14000" b="-14000"/>
+          </a:stretch>
+        </a:blipFill>
+        <a:effectLst/>
+      </p:bgPr>
+    </p:bg>
+    <p:spTree>
+      <p:nvGrpSpPr>
+        <p:cNvPr id="1" name=""/>
+        <p:cNvGrpSpPr/>
+        <p:nvPr/>
+      </p:nvGrpSpPr>
+      <p:grpSpPr>
+        <a:xfrm>
+          <a:off x="0" y="0"/>
+          <a:ext cx="0" cy="0"/>
+          <a:chOff x="0" y="0"/>
+          <a:chExt cx="0" cy="0"/>
+        </a:xfrm>
+      </p:grpSpPr>
+      <p:sp>
+        <p:nvSpPr>
+          <p:cNvPr id="2" name="Title 1">
+            <a:extLst>
+              <a:ext uri="{FF2B5EF4-FFF2-40B4-BE49-F238E27FC236}">
                 <a16:creationId xmlns:a16="http://schemas.microsoft.com/office/drawing/2014/main" id="{E9C44261-86D1-42CE-97C9-3FE3CFB03CC5}"/>
               </a:ext>
             </a:extLst>
@@ -3273,8 +3387,19 @@
           <a:noFill/>
         </p:spPr>
         <p:txBody>
-          <a:bodyPr/>
-          <a:lstStyle/>
+          <a:bodyPr>
+            <a:noAutofit/>
+          </a:bodyPr>
+          <a:lstStyle/>
+          <a:p>
+            <a:pPr marL="0" indent="0">
+              <a:buNone/>
+            </a:pPr>
+            <a:r>
+              <a:rPr lang="en-US" dirty="0"/>
+              <a:t>Background</a:t>
+            </a:r>
+          </a:p>
           <a:p>
             <a:r>
               <a:rPr lang="en-US" dirty="0"/>
@@ -3282,9 +3407,35 @@
             </a:r>
           </a:p>
           <a:p>
+            <a:pPr marL="0" indent="0">
+              <a:buNone/>
+            </a:pPr>
+            <a:r>
+              <a:rPr lang="en-US" dirty="0"/>
+              <a:t>Runge-</a:t>
+            </a:r>
+            <a:r>
+              <a:rPr lang="en-US" dirty="0" err="1"/>
+              <a:t>Kutta</a:t>
+            </a:r>
+            <a:r>
+              <a:rPr lang="en-US" dirty="0"/>
+              <a:t> for spacecraft</a:t>
+            </a:r>
+          </a:p>
+          <a:p>
             <a:r>
               <a:rPr lang="en-US" dirty="0"/>
               <a:t>https://www.researchgate.net/figure/Geometric-interpretation-of-the-fourth-order-Runge-Kutta-method_fig13_299354655</a:t>
+            </a:r>
+          </a:p>
+          <a:p>
+            <a:pPr marL="0" indent="0">
+              <a:buNone/>
+            </a:pPr>
+            <a:r>
+              <a:rPr lang="en-US" dirty="0"/>
+              <a:t>Orbital Data on planets</a:t>
             </a:r>
           </a:p>
           <a:p>
@@ -3299,6 +3450,293 @@
     <p:extLst>
       <p:ext uri="{BB962C8B-B14F-4D97-AF65-F5344CB8AC3E}">
         <p14:creationId xmlns:p14="http://schemas.microsoft.com/office/powerpoint/2010/main" val="2804585550"/>
+      </p:ext>
+    </p:extLst>
+  </p:cSld>
+  <p:clrMapOvr>
+    <a:masterClrMapping/>
+  </p:clrMapOvr>
+</p:sld>
+</file>
+
+<file path=ppt/slides/slide13.xml><?xml version="1.0" encoding="utf-8"?>
+<p:sld xmlns:a="http://schemas.openxmlformats.org/drawingml/2006/main" xmlns:r="http://schemas.openxmlformats.org/officeDocument/2006/relationships" xmlns:p="http://schemas.openxmlformats.org/presentationml/2006/main">
+  <p:cSld>
+    <p:bg>
+      <p:bgPr>
+        <a:blipFill dpi="0" rotWithShape="1">
+          <a:blip r:embed="rId2">
+            <a:lum/>
+          </a:blip>
+          <a:srcRect/>
+          <a:stretch>
+            <a:fillRect t="-14000" b="-14000"/>
+          </a:stretch>
+        </a:blipFill>
+        <a:effectLst/>
+      </p:bgPr>
+    </p:bg>
+    <p:spTree>
+      <p:nvGrpSpPr>
+        <p:cNvPr id="1" name=""/>
+        <p:cNvGrpSpPr/>
+        <p:nvPr/>
+      </p:nvGrpSpPr>
+      <p:grpSpPr>
+        <a:xfrm>
+          <a:off x="0" y="0"/>
+          <a:ext cx="0" cy="0"/>
+          <a:chOff x="0" y="0"/>
+          <a:chExt cx="0" cy="0"/>
+        </a:xfrm>
+      </p:grpSpPr>
+      <p:sp>
+        <p:nvSpPr>
+          <p:cNvPr id="2" name="Title 1">
+            <a:extLst>
+              <a:ext uri="{FF2B5EF4-FFF2-40B4-BE49-F238E27FC236}">
+                <a16:creationId xmlns:a16="http://schemas.microsoft.com/office/drawing/2014/main" id="{8F7688B3-7C48-4BFD-A07C-6C47700C2A34}"/>
+              </a:ext>
+            </a:extLst>
+          </p:cNvPr>
+          <p:cNvSpPr>
+            <a:spLocks noGrp="1"/>
+          </p:cNvSpPr>
+          <p:nvPr>
+            <p:ph type="title"/>
+          </p:nvPr>
+        </p:nvSpPr>
+        <p:spPr/>
+        <p:txBody>
+          <a:bodyPr/>
+          <a:lstStyle/>
+          <a:p>
+            <a:r>
+              <a:rPr lang="en-US" dirty="0"/>
+              <a:t>References</a:t>
+            </a:r>
+          </a:p>
+        </p:txBody>
+      </p:sp>
+      <p:sp>
+        <p:nvSpPr>
+          <p:cNvPr id="3" name="Content Placeholder 2">
+            <a:extLst>
+              <a:ext uri="{FF2B5EF4-FFF2-40B4-BE49-F238E27FC236}">
+                <a16:creationId xmlns:a16="http://schemas.microsoft.com/office/drawing/2014/main" id="{9C363D71-3264-44AF-AC3E-180A850C0FC9}"/>
+              </a:ext>
+            </a:extLst>
+          </p:cNvPr>
+          <p:cNvSpPr>
+            <a:spLocks noGrp="1"/>
+          </p:cNvSpPr>
+          <p:nvPr>
+            <p:ph idx="1"/>
+          </p:nvPr>
+        </p:nvSpPr>
+        <p:spPr/>
+        <p:txBody>
+          <a:bodyPr/>
+          <a:lstStyle/>
+          <a:p>
+            <a:pPr marL="0" indent="0">
+              <a:buNone/>
+            </a:pPr>
+            <a:r>
+              <a:rPr lang="en-US" dirty="0"/>
+              <a:t>Newton-Raphson for orbit calculation</a:t>
+            </a:r>
+          </a:p>
+          <a:p>
+            <a:r>
+              <a:rPr lang="en-US" dirty="0"/>
+              <a:t>M. </a:t>
+            </a:r>
+            <a:r>
+              <a:rPr lang="en-US" dirty="0" err="1"/>
+              <a:t>Capderou</a:t>
+            </a:r>
+            <a:r>
+              <a:rPr lang="en-US" dirty="0"/>
+              <a:t>, Handbook of Satellite Orbits: From Kepler to GPS</a:t>
+            </a:r>
+          </a:p>
+          <a:p>
+            <a:r>
+              <a:rPr lang="de-DE" dirty="0"/>
+              <a:t>O. Montenbruck, E. Gill, Satellite Orbits</a:t>
+            </a:r>
+            <a:endParaRPr lang="en-US" dirty="0"/>
+          </a:p>
+          <a:p>
+            <a:pPr marL="0" indent="0">
+              <a:buNone/>
+            </a:pPr>
+            <a:r>
+              <a:rPr lang="en-US" dirty="0"/>
+              <a:t>Data on Saturn V</a:t>
+            </a:r>
+          </a:p>
+          <a:p>
+            <a:r>
+              <a:rPr lang="en-US" dirty="0"/>
+              <a:t>https://www.nasa.gov/centers/johnson/rocketpark/saturn_v_third_stage.html</a:t>
+            </a:r>
+          </a:p>
+          <a:p>
+            <a:pPr marL="0" indent="0">
+              <a:buNone/>
+            </a:pPr>
+            <a:r>
+              <a:rPr lang="en-US" dirty="0"/>
+              <a:t>Reference for planetary positions</a:t>
+            </a:r>
+          </a:p>
+          <a:p>
+            <a:r>
+              <a:rPr lang="en-US" dirty="0"/>
+              <a:t>https://ssd.jpl.nasa.gov/horizons.cgi#results</a:t>
+            </a:r>
+          </a:p>
+          <a:p>
+            <a:pPr marL="0" indent="0">
+              <a:buNone/>
+            </a:pPr>
+            <a:endParaRPr lang="en-US" dirty="0"/>
+          </a:p>
+          <a:p>
+            <a:pPr marL="0" indent="0">
+              <a:buNone/>
+            </a:pPr>
+            <a:endParaRPr lang="en-US" dirty="0"/>
+          </a:p>
+        </p:txBody>
+      </p:sp>
+    </p:spTree>
+    <p:extLst>
+      <p:ext uri="{BB962C8B-B14F-4D97-AF65-F5344CB8AC3E}">
+        <p14:creationId xmlns:p14="http://schemas.microsoft.com/office/powerpoint/2010/main" val="3606363230"/>
+      </p:ext>
+    </p:extLst>
+  </p:cSld>
+  <p:clrMapOvr>
+    <a:masterClrMapping/>
+  </p:clrMapOvr>
+</p:sld>
+</file>
+
+<file path=ppt/slides/slide14.xml><?xml version="1.0" encoding="utf-8"?>
+<p:sld xmlns:a="http://schemas.openxmlformats.org/drawingml/2006/main" xmlns:r="http://schemas.openxmlformats.org/officeDocument/2006/relationships" xmlns:p="http://schemas.openxmlformats.org/presentationml/2006/main">
+  <p:cSld>
+    <p:bg>
+      <p:bgPr>
+        <a:blipFill dpi="0" rotWithShape="1">
+          <a:blip r:embed="rId2">
+            <a:lum/>
+          </a:blip>
+          <a:srcRect/>
+          <a:stretch>
+            <a:fillRect t="-14000" b="-14000"/>
+          </a:stretch>
+        </a:blipFill>
+        <a:effectLst/>
+      </p:bgPr>
+    </p:bg>
+    <p:spTree>
+      <p:nvGrpSpPr>
+        <p:cNvPr id="1" name=""/>
+        <p:cNvGrpSpPr/>
+        <p:nvPr/>
+      </p:nvGrpSpPr>
+      <p:grpSpPr>
+        <a:xfrm>
+          <a:off x="0" y="0"/>
+          <a:ext cx="0" cy="0"/>
+          <a:chOff x="0" y="0"/>
+          <a:chExt cx="0" cy="0"/>
+        </a:xfrm>
+      </p:grpSpPr>
+      <p:sp>
+        <p:nvSpPr>
+          <p:cNvPr id="2" name="Title 1">
+            <a:extLst>
+              <a:ext uri="{FF2B5EF4-FFF2-40B4-BE49-F238E27FC236}">
+                <a16:creationId xmlns:a16="http://schemas.microsoft.com/office/drawing/2014/main" id="{A79F5F3D-CDBF-44BF-96DC-C4FFF04333D5}"/>
+              </a:ext>
+            </a:extLst>
+          </p:cNvPr>
+          <p:cNvSpPr>
+            <a:spLocks noGrp="1"/>
+          </p:cNvSpPr>
+          <p:nvPr>
+            <p:ph type="title"/>
+          </p:nvPr>
+        </p:nvSpPr>
+        <p:spPr/>
+        <p:txBody>
+          <a:bodyPr/>
+          <a:lstStyle/>
+          <a:p>
+            <a:r>
+              <a:rPr lang="en-US" dirty="0"/>
+              <a:t>References</a:t>
+            </a:r>
+          </a:p>
+        </p:txBody>
+      </p:sp>
+      <p:sp>
+        <p:nvSpPr>
+          <p:cNvPr id="3" name="Content Placeholder 2">
+            <a:extLst>
+              <a:ext uri="{FF2B5EF4-FFF2-40B4-BE49-F238E27FC236}">
+                <a16:creationId xmlns:a16="http://schemas.microsoft.com/office/drawing/2014/main" id="{A989A625-4E18-4DB0-9816-A3EB8ED1FF56}"/>
+              </a:ext>
+            </a:extLst>
+          </p:cNvPr>
+          <p:cNvSpPr>
+            <a:spLocks noGrp="1"/>
+          </p:cNvSpPr>
+          <p:nvPr>
+            <p:ph idx="1"/>
+          </p:nvPr>
+        </p:nvSpPr>
+        <p:spPr/>
+        <p:txBody>
+          <a:bodyPr/>
+          <a:lstStyle/>
+          <a:p>
+            <a:pPr marL="0" indent="0">
+              <a:buNone/>
+            </a:pPr>
+            <a:r>
+              <a:rPr lang="en-US" dirty="0"/>
+              <a:t>Images</a:t>
+            </a:r>
+          </a:p>
+          <a:p>
+            <a:r>
+              <a:rPr lang="en-US" dirty="0"/>
+              <a:t>https://paulplusx.wordpress.com/2016/03/02/rtpts_azalt/</a:t>
+            </a:r>
+          </a:p>
+          <a:p>
+            <a:r>
+              <a:rPr lang="en-US" dirty="0"/>
+              <a:t>http://hyperphysics.phy-astr.gsu.edu/hbase/eclip.html</a:t>
+            </a:r>
+          </a:p>
+          <a:p>
+            <a:pPr marL="0" indent="0">
+              <a:buNone/>
+            </a:pPr>
+            <a:endParaRPr lang="en-US" dirty="0"/>
+          </a:p>
+        </p:txBody>
+      </p:sp>
+    </p:spTree>
+    <p:extLst>
+      <p:ext uri="{BB962C8B-B14F-4D97-AF65-F5344CB8AC3E}">
+        <p14:creationId xmlns:p14="http://schemas.microsoft.com/office/powerpoint/2010/main" val="1654851017"/>
       </p:ext>
     </p:extLst>
   </p:cSld>
@@ -4113,6 +4551,12 @@
             <a:r>
               <a:rPr lang="en-US" dirty="0"/>
               <a:t>This strength of that g field will be used to determine if a rocket has reached a planet</a:t>
+            </a:r>
+          </a:p>
+          <a:p>
+            <a:r>
+              <a:rPr lang="en-US" dirty="0"/>
+              <a:t>In cases where the g field is at a point inside the planet, the radius of the planet will be used</a:t>
             </a:r>
           </a:p>
           <a:p>

</xml_diff>